<commit_message>
Documenting object manager and CGame.
</commit_message>
<xml_diff>
--- a/Doxygen/games/1. Top Down Game/figures.pptx
+++ b/Doxygen/games/1. Top Down Game/figures.pptx
@@ -6,6 +6,7 @@
   </p:sldMasterIdLst>
   <p:sldIdLst>
     <p:sldId id="257" r:id="rId2"/>
+    <p:sldId id="258" r:id="rId3"/>
   </p:sldIdLst>
   <p:sldSz cx="12192000" cy="6858000"/>
   <p:notesSz cx="6858000" cy="9144000"/>
@@ -259,7 +260,7 @@
           <a:p>
             <a:fld id="{A2839C38-3006-452A-84B0-E89CEFF386CE}" type="datetimeFigureOut">
               <a:rPr lang="en-US" smtClean="0"/>
-              <a:t>8/21/2023</a:t>
+              <a:t>8/29/2023</a:t>
             </a:fld>
             <a:endParaRPr lang="en-US"/>
           </a:p>
@@ -457,7 +458,7 @@
           <a:p>
             <a:fld id="{A2839C38-3006-452A-84B0-E89CEFF386CE}" type="datetimeFigureOut">
               <a:rPr lang="en-US" smtClean="0"/>
-              <a:t>8/21/2023</a:t>
+              <a:t>8/29/2023</a:t>
             </a:fld>
             <a:endParaRPr lang="en-US"/>
           </a:p>
@@ -665,7 +666,7 @@
           <a:p>
             <a:fld id="{A2839C38-3006-452A-84B0-E89CEFF386CE}" type="datetimeFigureOut">
               <a:rPr lang="en-US" smtClean="0"/>
-              <a:t>8/21/2023</a:t>
+              <a:t>8/29/2023</a:t>
             </a:fld>
             <a:endParaRPr lang="en-US"/>
           </a:p>
@@ -863,7 +864,7 @@
           <a:p>
             <a:fld id="{A2839C38-3006-452A-84B0-E89CEFF386CE}" type="datetimeFigureOut">
               <a:rPr lang="en-US" smtClean="0"/>
-              <a:t>8/21/2023</a:t>
+              <a:t>8/29/2023</a:t>
             </a:fld>
             <a:endParaRPr lang="en-US"/>
           </a:p>
@@ -1138,7 +1139,7 @@
           <a:p>
             <a:fld id="{A2839C38-3006-452A-84B0-E89CEFF386CE}" type="datetimeFigureOut">
               <a:rPr lang="en-US" smtClean="0"/>
-              <a:t>8/21/2023</a:t>
+              <a:t>8/29/2023</a:t>
             </a:fld>
             <a:endParaRPr lang="en-US"/>
           </a:p>
@@ -1403,7 +1404,7 @@
           <a:p>
             <a:fld id="{A2839C38-3006-452A-84B0-E89CEFF386CE}" type="datetimeFigureOut">
               <a:rPr lang="en-US" smtClean="0"/>
-              <a:t>8/21/2023</a:t>
+              <a:t>8/29/2023</a:t>
             </a:fld>
             <a:endParaRPr lang="en-US"/>
           </a:p>
@@ -1815,7 +1816,7 @@
           <a:p>
             <a:fld id="{A2839C38-3006-452A-84B0-E89CEFF386CE}" type="datetimeFigureOut">
               <a:rPr lang="en-US" smtClean="0"/>
-              <a:t>8/21/2023</a:t>
+              <a:t>8/29/2023</a:t>
             </a:fld>
             <a:endParaRPr lang="en-US"/>
           </a:p>
@@ -1956,7 +1957,7 @@
           <a:p>
             <a:fld id="{A2839C38-3006-452A-84B0-E89CEFF386CE}" type="datetimeFigureOut">
               <a:rPr lang="en-US" smtClean="0"/>
-              <a:t>8/21/2023</a:t>
+              <a:t>8/29/2023</a:t>
             </a:fld>
             <a:endParaRPr lang="en-US"/>
           </a:p>
@@ -2069,7 +2070,7 @@
           <a:p>
             <a:fld id="{A2839C38-3006-452A-84B0-E89CEFF386CE}" type="datetimeFigureOut">
               <a:rPr lang="en-US" smtClean="0"/>
-              <a:t>8/21/2023</a:t>
+              <a:t>8/29/2023</a:t>
             </a:fld>
             <a:endParaRPr lang="en-US"/>
           </a:p>
@@ -2380,7 +2381,7 @@
           <a:p>
             <a:fld id="{A2839C38-3006-452A-84B0-E89CEFF386CE}" type="datetimeFigureOut">
               <a:rPr lang="en-US" smtClean="0"/>
-              <a:t>8/21/2023</a:t>
+              <a:t>8/29/2023</a:t>
             </a:fld>
             <a:endParaRPr lang="en-US"/>
           </a:p>
@@ -2668,7 +2669,7 @@
           <a:p>
             <a:fld id="{A2839C38-3006-452A-84B0-E89CEFF386CE}" type="datetimeFigureOut">
               <a:rPr lang="en-US" smtClean="0"/>
-              <a:t>8/21/2023</a:t>
+              <a:t>8/29/2023</a:t>
             </a:fld>
             <a:endParaRPr lang="en-US"/>
           </a:p>
@@ -2909,7 +2910,7 @@
           <a:p>
             <a:fld id="{A2839C38-3006-452A-84B0-E89CEFF386CE}" type="datetimeFigureOut">
               <a:rPr lang="en-US" smtClean="0"/>
-              <a:t>8/21/2023</a:t>
+              <a:t>8/29/2023</a:t>
             </a:fld>
             <a:endParaRPr lang="en-US"/>
           </a:p>
@@ -4224,6 +4225,1161 @@
 </p:sld>
 </file>
 
+<file path=ppt/slides/slide2.xml><?xml version="1.0" encoding="utf-8"?>
+<p:sld xmlns:a="http://schemas.openxmlformats.org/drawingml/2006/main" xmlns:r="http://schemas.openxmlformats.org/officeDocument/2006/relationships" xmlns:p="http://schemas.openxmlformats.org/presentationml/2006/main">
+  <p:cSld>
+    <p:spTree>
+      <p:nvGrpSpPr>
+        <p:cNvPr id="1" name=""/>
+        <p:cNvGrpSpPr/>
+        <p:nvPr/>
+      </p:nvGrpSpPr>
+      <p:grpSpPr>
+        <a:xfrm>
+          <a:off x="0" y="0"/>
+          <a:ext cx="0" cy="0"/>
+          <a:chOff x="0" y="0"/>
+          <a:chExt cx="0" cy="0"/>
+        </a:xfrm>
+      </p:grpSpPr>
+      <p:cxnSp>
+        <p:nvCxnSpPr>
+          <p:cNvPr id="63" name="Straight Arrow Connector 62">
+            <a:extLst>
+              <a:ext uri="{FF2B5EF4-FFF2-40B4-BE49-F238E27FC236}">
+                <a16:creationId xmlns:a16="http://schemas.microsoft.com/office/drawing/2014/main" id="{F2B64785-FBE2-4CB3-99F2-9F4911EFF60C}"/>
+              </a:ext>
+            </a:extLst>
+          </p:cNvPr>
+          <p:cNvCxnSpPr>
+            <a:cxnSpLocks/>
+          </p:cNvCxnSpPr>
+          <p:nvPr/>
+        </p:nvCxnSpPr>
+        <p:spPr>
+          <a:xfrm>
+            <a:off x="6677235" y="2208091"/>
+            <a:ext cx="613505" cy="712909"/>
+          </a:xfrm>
+          <a:prstGeom prst="straightConnector1">
+            <a:avLst/>
+          </a:prstGeom>
+          <a:ln w="25400">
+            <a:solidFill>
+              <a:schemeClr val="accent6"/>
+            </a:solidFill>
+            <a:headEnd type="arrow" w="med" len="lg"/>
+            <a:tailEnd type="none" w="med" len="lg"/>
+          </a:ln>
+        </p:spPr>
+        <p:style>
+          <a:lnRef idx="1">
+            <a:schemeClr val="accent1"/>
+          </a:lnRef>
+          <a:fillRef idx="0">
+            <a:schemeClr val="accent1"/>
+          </a:fillRef>
+          <a:effectRef idx="0">
+            <a:schemeClr val="accent1"/>
+          </a:effectRef>
+          <a:fontRef idx="minor">
+            <a:schemeClr val="tx1"/>
+          </a:fontRef>
+        </p:style>
+      </p:cxnSp>
+      <p:cxnSp>
+        <p:nvCxnSpPr>
+          <p:cNvPr id="66" name="Straight Arrow Connector 65">
+            <a:extLst>
+              <a:ext uri="{FF2B5EF4-FFF2-40B4-BE49-F238E27FC236}">
+                <a16:creationId xmlns:a16="http://schemas.microsoft.com/office/drawing/2014/main" id="{B76EA861-F453-4100-817C-857249AF8D02}"/>
+              </a:ext>
+            </a:extLst>
+          </p:cNvPr>
+          <p:cNvCxnSpPr>
+            <a:cxnSpLocks/>
+          </p:cNvCxnSpPr>
+          <p:nvPr/>
+        </p:nvCxnSpPr>
+        <p:spPr>
+          <a:xfrm flipH="1">
+            <a:off x="5352409" y="2273300"/>
+            <a:ext cx="413391" cy="619952"/>
+          </a:xfrm>
+          <a:prstGeom prst="straightConnector1">
+            <a:avLst/>
+          </a:prstGeom>
+          <a:ln w="25400">
+            <a:solidFill>
+              <a:schemeClr val="accent5"/>
+            </a:solidFill>
+            <a:headEnd type="none" w="med" len="lg"/>
+            <a:tailEnd type="arrow" w="med" len="lg"/>
+          </a:ln>
+        </p:spPr>
+        <p:style>
+          <a:lnRef idx="1">
+            <a:schemeClr val="accent1"/>
+          </a:lnRef>
+          <a:fillRef idx="0">
+            <a:schemeClr val="accent1"/>
+          </a:fillRef>
+          <a:effectRef idx="0">
+            <a:schemeClr val="accent1"/>
+          </a:effectRef>
+          <a:fontRef idx="minor">
+            <a:schemeClr val="tx1"/>
+          </a:fontRef>
+        </p:style>
+      </p:cxnSp>
+      <p:cxnSp>
+        <p:nvCxnSpPr>
+          <p:cNvPr id="76" name="Straight Arrow Connector 75">
+            <a:extLst>
+              <a:ext uri="{FF2B5EF4-FFF2-40B4-BE49-F238E27FC236}">
+                <a16:creationId xmlns:a16="http://schemas.microsoft.com/office/drawing/2014/main" id="{47A7AA03-043B-488F-8657-3DC2AB3B2A4B}"/>
+              </a:ext>
+            </a:extLst>
+          </p:cNvPr>
+          <p:cNvCxnSpPr>
+            <a:cxnSpLocks/>
+            <a:endCxn id="20" idx="1"/>
+          </p:cNvCxnSpPr>
+          <p:nvPr/>
+        </p:nvCxnSpPr>
+        <p:spPr>
+          <a:xfrm>
+            <a:off x="5238750" y="4006850"/>
+            <a:ext cx="516669" cy="784868"/>
+          </a:xfrm>
+          <a:prstGeom prst="straightConnector1">
+            <a:avLst/>
+          </a:prstGeom>
+          <a:ln w="25400">
+            <a:solidFill>
+              <a:srgbClr val="7030A0"/>
+            </a:solidFill>
+            <a:headEnd type="none"/>
+            <a:tailEnd type="arrow" w="med" len="lg"/>
+          </a:ln>
+        </p:spPr>
+        <p:style>
+          <a:lnRef idx="1">
+            <a:schemeClr val="accent1"/>
+          </a:lnRef>
+          <a:fillRef idx="0">
+            <a:schemeClr val="accent1"/>
+          </a:fillRef>
+          <a:effectRef idx="0">
+            <a:schemeClr val="accent1"/>
+          </a:effectRef>
+          <a:fontRef idx="minor">
+            <a:schemeClr val="tx1"/>
+          </a:fontRef>
+        </p:style>
+      </p:cxnSp>
+      <p:cxnSp>
+        <p:nvCxnSpPr>
+          <p:cNvPr id="60" name="Straight Arrow Connector 59">
+            <a:extLst>
+              <a:ext uri="{FF2B5EF4-FFF2-40B4-BE49-F238E27FC236}">
+                <a16:creationId xmlns:a16="http://schemas.microsoft.com/office/drawing/2014/main" id="{970480BA-DD21-4B5E-B032-99E50210808D}"/>
+              </a:ext>
+            </a:extLst>
+          </p:cNvPr>
+          <p:cNvCxnSpPr>
+            <a:cxnSpLocks/>
+            <a:endCxn id="18" idx="1"/>
+          </p:cNvCxnSpPr>
+          <p:nvPr/>
+        </p:nvCxnSpPr>
+        <p:spPr>
+          <a:xfrm>
+            <a:off x="6494591" y="2292285"/>
+            <a:ext cx="606343" cy="710337"/>
+          </a:xfrm>
+          <a:prstGeom prst="straightConnector1">
+            <a:avLst/>
+          </a:prstGeom>
+          <a:ln w="25400">
+            <a:solidFill>
+              <a:schemeClr val="accent6"/>
+            </a:solidFill>
+            <a:headEnd type="none"/>
+            <a:tailEnd type="arrow" w="med" len="lg"/>
+          </a:ln>
+        </p:spPr>
+        <p:style>
+          <a:lnRef idx="1">
+            <a:schemeClr val="accent1"/>
+          </a:lnRef>
+          <a:fillRef idx="0">
+            <a:schemeClr val="accent1"/>
+          </a:fillRef>
+          <a:effectRef idx="0">
+            <a:schemeClr val="accent1"/>
+          </a:effectRef>
+          <a:fontRef idx="minor">
+            <a:schemeClr val="tx1"/>
+          </a:fontRef>
+        </p:style>
+      </p:cxnSp>
+      <p:cxnSp>
+        <p:nvCxnSpPr>
+          <p:cNvPr id="43" name="Straight Arrow Connector 42">
+            <a:extLst>
+              <a:ext uri="{FF2B5EF4-FFF2-40B4-BE49-F238E27FC236}">
+                <a16:creationId xmlns:a16="http://schemas.microsoft.com/office/drawing/2014/main" id="{FB294D94-931E-4C23-B1DF-5D83BE3E9FA3}"/>
+              </a:ext>
+            </a:extLst>
+          </p:cNvPr>
+          <p:cNvCxnSpPr>
+            <a:cxnSpLocks/>
+          </p:cNvCxnSpPr>
+          <p:nvPr/>
+        </p:nvCxnSpPr>
+        <p:spPr>
+          <a:xfrm flipH="1">
+            <a:off x="5656568" y="3610184"/>
+            <a:ext cx="1866933" cy="0"/>
+          </a:xfrm>
+          <a:prstGeom prst="straightConnector1">
+            <a:avLst/>
+          </a:prstGeom>
+          <a:ln w="25400">
+            <a:solidFill>
+              <a:schemeClr val="accent5"/>
+            </a:solidFill>
+            <a:headEnd type="none"/>
+            <a:tailEnd type="arrow" w="med" len="lg"/>
+          </a:ln>
+        </p:spPr>
+        <p:style>
+          <a:lnRef idx="1">
+            <a:schemeClr val="accent1"/>
+          </a:lnRef>
+          <a:fillRef idx="0">
+            <a:schemeClr val="accent1"/>
+          </a:fillRef>
+          <a:effectRef idx="0">
+            <a:schemeClr val="accent1"/>
+          </a:effectRef>
+          <a:fontRef idx="minor">
+            <a:schemeClr val="tx1"/>
+          </a:fontRef>
+        </p:style>
+      </p:cxnSp>
+      <p:cxnSp>
+        <p:nvCxnSpPr>
+          <p:cNvPr id="10" name="Straight Arrow Connector 9">
+            <a:extLst>
+              <a:ext uri="{FF2B5EF4-FFF2-40B4-BE49-F238E27FC236}">
+                <a16:creationId xmlns:a16="http://schemas.microsoft.com/office/drawing/2014/main" id="{A43DCDE9-871A-40AD-8E27-53ED0D18791C}"/>
+              </a:ext>
+            </a:extLst>
+          </p:cNvPr>
+          <p:cNvCxnSpPr>
+            <a:cxnSpLocks/>
+          </p:cNvCxnSpPr>
+          <p:nvPr/>
+        </p:nvCxnSpPr>
+        <p:spPr>
+          <a:xfrm>
+            <a:off x="5193018" y="1168659"/>
+            <a:ext cx="463550" cy="301675"/>
+          </a:xfrm>
+          <a:prstGeom prst="straightConnector1">
+            <a:avLst/>
+          </a:prstGeom>
+          <a:ln w="25400">
+            <a:solidFill>
+              <a:schemeClr val="tx1"/>
+            </a:solidFill>
+            <a:headEnd type="none"/>
+            <a:tailEnd type="arrow" w="med" len="lg"/>
+          </a:ln>
+        </p:spPr>
+        <p:style>
+          <a:lnRef idx="1">
+            <a:schemeClr val="accent1"/>
+          </a:lnRef>
+          <a:fillRef idx="0">
+            <a:schemeClr val="accent1"/>
+          </a:fillRef>
+          <a:effectRef idx="0">
+            <a:schemeClr val="accent1"/>
+          </a:effectRef>
+          <a:fontRef idx="minor">
+            <a:schemeClr val="tx1"/>
+          </a:fontRef>
+        </p:style>
+      </p:cxnSp>
+      <p:grpSp>
+        <p:nvGrpSpPr>
+          <p:cNvPr id="24" name="Group 23">
+            <a:extLst>
+              <a:ext uri="{FF2B5EF4-FFF2-40B4-BE49-F238E27FC236}">
+                <a16:creationId xmlns:a16="http://schemas.microsoft.com/office/drawing/2014/main" id="{7268972F-8701-4966-AF7D-610324A44951}"/>
+              </a:ext>
+            </a:extLst>
+          </p:cNvPr>
+          <p:cNvGrpSpPr/>
+          <p:nvPr/>
+        </p:nvGrpSpPr>
+        <p:grpSpPr>
+          <a:xfrm>
+            <a:off x="5577083" y="1183151"/>
+            <a:ext cx="1259862" cy="1259862"/>
+            <a:chOff x="4791687" y="1876388"/>
+            <a:chExt cx="1259862" cy="1259862"/>
+          </a:xfrm>
+        </p:grpSpPr>
+        <p:sp>
+          <p:nvSpPr>
+            <p:cNvPr id="12" name="Oval 11">
+              <a:extLst>
+                <a:ext uri="{FF2B5EF4-FFF2-40B4-BE49-F238E27FC236}">
+                  <a16:creationId xmlns:a16="http://schemas.microsoft.com/office/drawing/2014/main" id="{DF7A6705-C742-4599-950E-4A7F10013925}"/>
+                </a:ext>
+              </a:extLst>
+            </p:cNvPr>
+            <p:cNvSpPr/>
+            <p:nvPr/>
+          </p:nvSpPr>
+          <p:spPr>
+            <a:xfrm>
+              <a:off x="4791687" y="1876388"/>
+              <a:ext cx="1259862" cy="1259862"/>
+            </a:xfrm>
+            <a:prstGeom prst="ellipse">
+              <a:avLst/>
+            </a:prstGeom>
+            <a:solidFill>
+              <a:schemeClr val="bg1"/>
+            </a:solidFill>
+            <a:ln w="25400">
+              <a:solidFill>
+                <a:schemeClr val="tx1"/>
+              </a:solidFill>
+            </a:ln>
+          </p:spPr>
+          <p:style>
+            <a:lnRef idx="2">
+              <a:schemeClr val="accent1">
+                <a:shade val="50000"/>
+              </a:schemeClr>
+            </a:lnRef>
+            <a:fillRef idx="1">
+              <a:schemeClr val="accent1"/>
+            </a:fillRef>
+            <a:effectRef idx="0">
+              <a:schemeClr val="accent1"/>
+            </a:effectRef>
+            <a:fontRef idx="minor">
+              <a:schemeClr val="lt1"/>
+            </a:fontRef>
+          </p:style>
+          <p:txBody>
+            <a:bodyPr rtlCol="0" anchor="ctr"/>
+            <a:lstStyle/>
+            <a:p>
+              <a:pPr algn="ctr"/>
+              <a:endParaRPr lang="en-US" dirty="0">
+                <a:solidFill>
+                  <a:schemeClr val="tx1"/>
+                </a:solidFill>
+              </a:endParaRPr>
+            </a:p>
+          </p:txBody>
+        </p:sp>
+        <p:sp>
+          <p:nvSpPr>
+            <p:cNvPr id="15" name="TextBox 14">
+              <a:extLst>
+                <a:ext uri="{FF2B5EF4-FFF2-40B4-BE49-F238E27FC236}">
+                  <a16:creationId xmlns:a16="http://schemas.microsoft.com/office/drawing/2014/main" id="{82988DC6-AFD5-4329-BEFB-44C8DA0157A1}"/>
+                </a:ext>
+              </a:extLst>
+            </p:cNvPr>
+            <p:cNvSpPr txBox="1"/>
+            <p:nvPr/>
+          </p:nvSpPr>
+          <p:spPr>
+            <a:xfrm>
+              <a:off x="4791687" y="2321653"/>
+              <a:ext cx="1259862" cy="369332"/>
+            </a:xfrm>
+            <a:prstGeom prst="rect">
+              <a:avLst/>
+            </a:prstGeom>
+            <a:noFill/>
+          </p:spPr>
+          <p:txBody>
+            <a:bodyPr wrap="square" rtlCol="0">
+              <a:spAutoFit/>
+            </a:bodyPr>
+            <a:lstStyle/>
+            <a:p>
+              <a:pPr algn="ctr"/>
+              <a:r>
+                <a:rPr lang="en-US" dirty="0"/>
+                <a:t>Scanning</a:t>
+              </a:r>
+            </a:p>
+          </p:txBody>
+        </p:sp>
+      </p:grpSp>
+      <p:grpSp>
+        <p:nvGrpSpPr>
+          <p:cNvPr id="23" name="Group 22">
+            <a:extLst>
+              <a:ext uri="{FF2B5EF4-FFF2-40B4-BE49-F238E27FC236}">
+                <a16:creationId xmlns:a16="http://schemas.microsoft.com/office/drawing/2014/main" id="{D6378F9E-FE74-444E-B944-1007583CA59E}"/>
+              </a:ext>
+            </a:extLst>
+          </p:cNvPr>
+          <p:cNvGrpSpPr/>
+          <p:nvPr/>
+        </p:nvGrpSpPr>
+        <p:grpSpPr>
+          <a:xfrm>
+            <a:off x="4396706" y="2818119"/>
+            <a:ext cx="1260095" cy="1259862"/>
+            <a:chOff x="4022056" y="3429000"/>
+            <a:chExt cx="1260095" cy="1259862"/>
+          </a:xfrm>
+        </p:grpSpPr>
+        <p:sp>
+          <p:nvSpPr>
+            <p:cNvPr id="16" name="Oval 15">
+              <a:extLst>
+                <a:ext uri="{FF2B5EF4-FFF2-40B4-BE49-F238E27FC236}">
+                  <a16:creationId xmlns:a16="http://schemas.microsoft.com/office/drawing/2014/main" id="{08F7355E-9A0B-4269-AF84-DB7DD443D6EA}"/>
+                </a:ext>
+              </a:extLst>
+            </p:cNvPr>
+            <p:cNvSpPr/>
+            <p:nvPr/>
+          </p:nvSpPr>
+          <p:spPr>
+            <a:xfrm>
+              <a:off x="4022289" y="3429000"/>
+              <a:ext cx="1259862" cy="1259862"/>
+            </a:xfrm>
+            <a:prstGeom prst="ellipse">
+              <a:avLst/>
+            </a:prstGeom>
+            <a:solidFill>
+              <a:schemeClr val="bg1"/>
+            </a:solidFill>
+            <a:ln w="25400">
+              <a:solidFill>
+                <a:schemeClr val="tx1"/>
+              </a:solidFill>
+            </a:ln>
+          </p:spPr>
+          <p:style>
+            <a:lnRef idx="2">
+              <a:schemeClr val="accent1">
+                <a:shade val="50000"/>
+              </a:schemeClr>
+            </a:lnRef>
+            <a:fillRef idx="1">
+              <a:schemeClr val="accent1"/>
+            </a:fillRef>
+            <a:effectRef idx="0">
+              <a:schemeClr val="accent1"/>
+            </a:effectRef>
+            <a:fontRef idx="minor">
+              <a:schemeClr val="lt1"/>
+            </a:fontRef>
+          </p:style>
+          <p:txBody>
+            <a:bodyPr rtlCol="0" anchor="ctr"/>
+            <a:lstStyle/>
+            <a:p>
+              <a:pPr algn="ctr"/>
+              <a:endParaRPr lang="en-US" dirty="0">
+                <a:solidFill>
+                  <a:schemeClr val="tx1"/>
+                </a:solidFill>
+              </a:endParaRPr>
+            </a:p>
+          </p:txBody>
+        </p:sp>
+        <p:sp>
+          <p:nvSpPr>
+            <p:cNvPr id="17" name="TextBox 16">
+              <a:extLst>
+                <a:ext uri="{FF2B5EF4-FFF2-40B4-BE49-F238E27FC236}">
+                  <a16:creationId xmlns:a16="http://schemas.microsoft.com/office/drawing/2014/main" id="{25CAC6C4-7937-4BD8-91FF-5F881CA568B7}"/>
+                </a:ext>
+              </a:extLst>
+            </p:cNvPr>
+            <p:cNvSpPr txBox="1"/>
+            <p:nvPr/>
+          </p:nvSpPr>
+          <p:spPr>
+            <a:xfrm>
+              <a:off x="4022056" y="3874265"/>
+              <a:ext cx="1259863" cy="369332"/>
+            </a:xfrm>
+            <a:prstGeom prst="rect">
+              <a:avLst/>
+            </a:prstGeom>
+            <a:noFill/>
+          </p:spPr>
+          <p:txBody>
+            <a:bodyPr wrap="square" rtlCol="0">
+              <a:spAutoFit/>
+            </a:bodyPr>
+            <a:lstStyle/>
+            <a:p>
+              <a:pPr algn="ctr"/>
+              <a:r>
+                <a:rPr lang="en-US" dirty="0"/>
+                <a:t>Alert</a:t>
+              </a:r>
+            </a:p>
+          </p:txBody>
+        </p:sp>
+      </p:grpSp>
+      <p:grpSp>
+        <p:nvGrpSpPr>
+          <p:cNvPr id="25" name="Group 24">
+            <a:extLst>
+              <a:ext uri="{FF2B5EF4-FFF2-40B4-BE49-F238E27FC236}">
+                <a16:creationId xmlns:a16="http://schemas.microsoft.com/office/drawing/2014/main" id="{8FAE3819-4A21-4B21-AB2D-59F317A9B3AD}"/>
+              </a:ext>
+            </a:extLst>
+          </p:cNvPr>
+          <p:cNvGrpSpPr/>
+          <p:nvPr/>
+        </p:nvGrpSpPr>
+        <p:grpSpPr>
+          <a:xfrm>
+            <a:off x="6916431" y="2818119"/>
+            <a:ext cx="1259862" cy="1259862"/>
+            <a:chOff x="6279920" y="3429000"/>
+            <a:chExt cx="1259862" cy="1259862"/>
+          </a:xfrm>
+        </p:grpSpPr>
+        <p:sp>
+          <p:nvSpPr>
+            <p:cNvPr id="18" name="Oval 17">
+              <a:extLst>
+                <a:ext uri="{FF2B5EF4-FFF2-40B4-BE49-F238E27FC236}">
+                  <a16:creationId xmlns:a16="http://schemas.microsoft.com/office/drawing/2014/main" id="{F2BE1F28-1F86-4113-B060-A8E9BF8CE479}"/>
+                </a:ext>
+              </a:extLst>
+            </p:cNvPr>
+            <p:cNvSpPr/>
+            <p:nvPr/>
+          </p:nvSpPr>
+          <p:spPr>
+            <a:xfrm>
+              <a:off x="6279920" y="3429000"/>
+              <a:ext cx="1259862" cy="1259862"/>
+            </a:xfrm>
+            <a:prstGeom prst="ellipse">
+              <a:avLst/>
+            </a:prstGeom>
+            <a:solidFill>
+              <a:schemeClr val="bg1"/>
+            </a:solidFill>
+            <a:ln w="25400">
+              <a:solidFill>
+                <a:schemeClr val="tx1"/>
+              </a:solidFill>
+            </a:ln>
+          </p:spPr>
+          <p:style>
+            <a:lnRef idx="2">
+              <a:schemeClr val="accent1">
+                <a:shade val="50000"/>
+              </a:schemeClr>
+            </a:lnRef>
+            <a:fillRef idx="1">
+              <a:schemeClr val="accent1"/>
+            </a:fillRef>
+            <a:effectRef idx="0">
+              <a:schemeClr val="accent1"/>
+            </a:effectRef>
+            <a:fontRef idx="minor">
+              <a:schemeClr val="lt1"/>
+            </a:fontRef>
+          </p:style>
+          <p:txBody>
+            <a:bodyPr rtlCol="0" anchor="ctr"/>
+            <a:lstStyle/>
+            <a:p>
+              <a:pPr algn="ctr"/>
+              <a:endParaRPr lang="en-US" dirty="0">
+                <a:solidFill>
+                  <a:schemeClr val="tx1"/>
+                </a:solidFill>
+              </a:endParaRPr>
+            </a:p>
+          </p:txBody>
+        </p:sp>
+        <p:sp>
+          <p:nvSpPr>
+            <p:cNvPr id="19" name="TextBox 18">
+              <a:extLst>
+                <a:ext uri="{FF2B5EF4-FFF2-40B4-BE49-F238E27FC236}">
+                  <a16:creationId xmlns:a16="http://schemas.microsoft.com/office/drawing/2014/main" id="{6CB83623-CEA4-493C-B170-BB91E23FA72C}"/>
+                </a:ext>
+              </a:extLst>
+            </p:cNvPr>
+            <p:cNvSpPr txBox="1"/>
+            <p:nvPr/>
+          </p:nvSpPr>
+          <p:spPr>
+            <a:xfrm>
+              <a:off x="6279920" y="3874265"/>
+              <a:ext cx="1259862" cy="369332"/>
+            </a:xfrm>
+            <a:prstGeom prst="rect">
+              <a:avLst/>
+            </a:prstGeom>
+            <a:noFill/>
+          </p:spPr>
+          <p:txBody>
+            <a:bodyPr wrap="square" rtlCol="0">
+              <a:spAutoFit/>
+            </a:bodyPr>
+            <a:lstStyle/>
+            <a:p>
+              <a:pPr algn="ctr"/>
+              <a:r>
+                <a:rPr lang="en-US" dirty="0"/>
+                <a:t>Waiting</a:t>
+              </a:r>
+            </a:p>
+          </p:txBody>
+        </p:sp>
+      </p:grpSp>
+      <p:grpSp>
+        <p:nvGrpSpPr>
+          <p:cNvPr id="22" name="Group 21">
+            <a:extLst>
+              <a:ext uri="{FF2B5EF4-FFF2-40B4-BE49-F238E27FC236}">
+                <a16:creationId xmlns:a16="http://schemas.microsoft.com/office/drawing/2014/main" id="{56837DA6-836A-4144-987E-5C674AF9B8B1}"/>
+              </a:ext>
+            </a:extLst>
+          </p:cNvPr>
+          <p:cNvGrpSpPr/>
+          <p:nvPr/>
+        </p:nvGrpSpPr>
+        <p:grpSpPr>
+          <a:xfrm>
+            <a:off x="5570916" y="4607215"/>
+            <a:ext cx="1259862" cy="1259862"/>
+            <a:chOff x="5282151" y="4981612"/>
+            <a:chExt cx="1259862" cy="1259862"/>
+          </a:xfrm>
+        </p:grpSpPr>
+        <p:sp>
+          <p:nvSpPr>
+            <p:cNvPr id="20" name="Oval 19">
+              <a:extLst>
+                <a:ext uri="{FF2B5EF4-FFF2-40B4-BE49-F238E27FC236}">
+                  <a16:creationId xmlns:a16="http://schemas.microsoft.com/office/drawing/2014/main" id="{B290872A-F489-4AD0-93C4-A586CF39D1D1}"/>
+                </a:ext>
+              </a:extLst>
+            </p:cNvPr>
+            <p:cNvSpPr/>
+            <p:nvPr/>
+          </p:nvSpPr>
+          <p:spPr>
+            <a:xfrm>
+              <a:off x="5282151" y="4981612"/>
+              <a:ext cx="1259862" cy="1259862"/>
+            </a:xfrm>
+            <a:prstGeom prst="ellipse">
+              <a:avLst/>
+            </a:prstGeom>
+            <a:solidFill>
+              <a:schemeClr val="bg1"/>
+            </a:solidFill>
+            <a:ln w="25400">
+              <a:solidFill>
+                <a:schemeClr val="tx1"/>
+              </a:solidFill>
+            </a:ln>
+          </p:spPr>
+          <p:style>
+            <a:lnRef idx="2">
+              <a:schemeClr val="accent1">
+                <a:shade val="50000"/>
+              </a:schemeClr>
+            </a:lnRef>
+            <a:fillRef idx="1">
+              <a:schemeClr val="accent1"/>
+            </a:fillRef>
+            <a:effectRef idx="0">
+              <a:schemeClr val="accent1"/>
+            </a:effectRef>
+            <a:fontRef idx="minor">
+              <a:schemeClr val="lt1"/>
+            </a:fontRef>
+          </p:style>
+          <p:txBody>
+            <a:bodyPr rtlCol="0" anchor="ctr"/>
+            <a:lstStyle/>
+            <a:p>
+              <a:pPr algn="ctr"/>
+              <a:endParaRPr lang="en-US" dirty="0">
+                <a:solidFill>
+                  <a:schemeClr val="tx1"/>
+                </a:solidFill>
+              </a:endParaRPr>
+            </a:p>
+          </p:txBody>
+        </p:sp>
+        <p:sp>
+          <p:nvSpPr>
+            <p:cNvPr id="21" name="TextBox 20">
+              <a:extLst>
+                <a:ext uri="{FF2B5EF4-FFF2-40B4-BE49-F238E27FC236}">
+                  <a16:creationId xmlns:a16="http://schemas.microsoft.com/office/drawing/2014/main" id="{671345F9-B333-4E10-8148-322C164741B8}"/>
+                </a:ext>
+              </a:extLst>
+            </p:cNvPr>
+            <p:cNvSpPr txBox="1"/>
+            <p:nvPr/>
+          </p:nvSpPr>
+          <p:spPr>
+            <a:xfrm>
+              <a:off x="5342269" y="5426877"/>
+              <a:ext cx="1139625" cy="369332"/>
+            </a:xfrm>
+            <a:prstGeom prst="rect">
+              <a:avLst/>
+            </a:prstGeom>
+            <a:noFill/>
+          </p:spPr>
+          <p:txBody>
+            <a:bodyPr wrap="square" rtlCol="0">
+              <a:spAutoFit/>
+            </a:bodyPr>
+            <a:lstStyle/>
+            <a:p>
+              <a:pPr algn="ctr"/>
+              <a:r>
+                <a:rPr lang="en-US" dirty="0"/>
+                <a:t>Reloading</a:t>
+              </a:r>
+            </a:p>
+          </p:txBody>
+        </p:sp>
+      </p:grpSp>
+      <p:sp>
+        <p:nvSpPr>
+          <p:cNvPr id="42" name="TextBox 41">
+            <a:extLst>
+              <a:ext uri="{FF2B5EF4-FFF2-40B4-BE49-F238E27FC236}">
+                <a16:creationId xmlns:a16="http://schemas.microsoft.com/office/drawing/2014/main" id="{D68AD9CD-445F-4AD6-BE37-C98D46DB1E8E}"/>
+              </a:ext>
+            </a:extLst>
+          </p:cNvPr>
+          <p:cNvSpPr txBox="1"/>
+          <p:nvPr/>
+        </p:nvSpPr>
+        <p:spPr>
+          <a:xfrm>
+            <a:off x="4521343" y="2151489"/>
+            <a:ext cx="1203890" cy="461665"/>
+          </a:xfrm>
+          <a:prstGeom prst="rect">
+            <a:avLst/>
+          </a:prstGeom>
+          <a:noFill/>
+        </p:spPr>
+        <p:txBody>
+          <a:bodyPr wrap="square" rtlCol="0">
+            <a:spAutoFit/>
+          </a:bodyPr>
+          <a:lstStyle/>
+          <a:p>
+            <a:pPr algn="ctr"/>
+            <a:r>
+              <a:rPr lang="en-US" sz="1200" dirty="0">
+                <a:solidFill>
+                  <a:schemeClr val="accent5"/>
+                </a:solidFill>
+              </a:rPr>
+              <a:t>Player close or vulnerable</a:t>
+            </a:r>
+          </a:p>
+        </p:txBody>
+      </p:sp>
+      <p:sp>
+        <p:nvSpPr>
+          <p:cNvPr id="47" name="TextBox 46">
+            <a:extLst>
+              <a:ext uri="{FF2B5EF4-FFF2-40B4-BE49-F238E27FC236}">
+                <a16:creationId xmlns:a16="http://schemas.microsoft.com/office/drawing/2014/main" id="{E8AF4531-1C87-486E-BDFA-44916723E2C8}"/>
+              </a:ext>
+            </a:extLst>
+          </p:cNvPr>
+          <p:cNvSpPr txBox="1"/>
+          <p:nvPr/>
+        </p:nvSpPr>
+        <p:spPr>
+          <a:xfrm>
+            <a:off x="5783442" y="3629439"/>
+            <a:ext cx="1203890" cy="461665"/>
+          </a:xfrm>
+          <a:prstGeom prst="rect">
+            <a:avLst/>
+          </a:prstGeom>
+          <a:noFill/>
+        </p:spPr>
+        <p:txBody>
+          <a:bodyPr wrap="square" rtlCol="0">
+            <a:spAutoFit/>
+          </a:bodyPr>
+          <a:lstStyle/>
+          <a:p>
+            <a:pPr algn="ctr"/>
+            <a:r>
+              <a:rPr lang="en-US" sz="1200" dirty="0">
+                <a:solidFill>
+                  <a:schemeClr val="accent5"/>
+                </a:solidFill>
+              </a:rPr>
+              <a:t>Player close or vulnerable</a:t>
+            </a:r>
+          </a:p>
+        </p:txBody>
+      </p:sp>
+      <p:cxnSp>
+        <p:nvCxnSpPr>
+          <p:cNvPr id="50" name="Straight Arrow Connector 49">
+            <a:extLst>
+              <a:ext uri="{FF2B5EF4-FFF2-40B4-BE49-F238E27FC236}">
+                <a16:creationId xmlns:a16="http://schemas.microsoft.com/office/drawing/2014/main" id="{A9D4E939-A4E6-402E-BEA3-C44CCA0C71DA}"/>
+              </a:ext>
+            </a:extLst>
+          </p:cNvPr>
+          <p:cNvCxnSpPr>
+            <a:cxnSpLocks/>
+            <a:stCxn id="20" idx="7"/>
+          </p:cNvCxnSpPr>
+          <p:nvPr/>
+        </p:nvCxnSpPr>
+        <p:spPr>
+          <a:xfrm flipV="1">
+            <a:off x="6646275" y="4006850"/>
+            <a:ext cx="592668" cy="784868"/>
+          </a:xfrm>
+          <a:prstGeom prst="straightConnector1">
+            <a:avLst/>
+          </a:prstGeom>
+          <a:ln w="25400">
+            <a:solidFill>
+              <a:srgbClr val="7030A0"/>
+            </a:solidFill>
+            <a:headEnd type="none"/>
+            <a:tailEnd type="arrow" w="med" len="lg"/>
+          </a:ln>
+        </p:spPr>
+        <p:style>
+          <a:lnRef idx="1">
+            <a:schemeClr val="accent1"/>
+          </a:lnRef>
+          <a:fillRef idx="0">
+            <a:schemeClr val="accent1"/>
+          </a:fillRef>
+          <a:effectRef idx="0">
+            <a:schemeClr val="accent1"/>
+          </a:effectRef>
+          <a:fontRef idx="minor">
+            <a:schemeClr val="tx1"/>
+          </a:fontRef>
+        </p:style>
+      </p:cxnSp>
+      <p:sp>
+        <p:nvSpPr>
+          <p:cNvPr id="53" name="TextBox 52">
+            <a:extLst>
+              <a:ext uri="{FF2B5EF4-FFF2-40B4-BE49-F238E27FC236}">
+                <a16:creationId xmlns:a16="http://schemas.microsoft.com/office/drawing/2014/main" id="{F5B09D50-E080-4330-A920-322BD43F083B}"/>
+              </a:ext>
+            </a:extLst>
+          </p:cNvPr>
+          <p:cNvSpPr txBox="1"/>
+          <p:nvPr/>
+        </p:nvSpPr>
+        <p:spPr>
+          <a:xfrm>
+            <a:off x="6925909" y="4363259"/>
+            <a:ext cx="1203890" cy="461665"/>
+          </a:xfrm>
+          <a:prstGeom prst="rect">
+            <a:avLst/>
+          </a:prstGeom>
+          <a:noFill/>
+        </p:spPr>
+        <p:txBody>
+          <a:bodyPr wrap="square" rtlCol="0">
+            <a:spAutoFit/>
+          </a:bodyPr>
+          <a:lstStyle/>
+          <a:p>
+            <a:pPr algn="ctr"/>
+            <a:r>
+              <a:rPr lang="en-US" sz="1200" dirty="0">
+                <a:solidFill>
+                  <a:srgbClr val="7030A0"/>
+                </a:solidFill>
+              </a:rPr>
+              <a:t>Frame event for last frame</a:t>
+            </a:r>
+          </a:p>
+        </p:txBody>
+      </p:sp>
+      <p:sp>
+        <p:nvSpPr>
+          <p:cNvPr id="56" name="TextBox 55">
+            <a:extLst>
+              <a:ext uri="{FF2B5EF4-FFF2-40B4-BE49-F238E27FC236}">
+                <a16:creationId xmlns:a16="http://schemas.microsoft.com/office/drawing/2014/main" id="{32DA31B7-2BD4-4497-B03C-0E8DFC129A1E}"/>
+              </a:ext>
+            </a:extLst>
+          </p:cNvPr>
+          <p:cNvSpPr txBox="1"/>
+          <p:nvPr/>
+        </p:nvSpPr>
+        <p:spPr>
+          <a:xfrm rot="3004434">
+            <a:off x="6189978" y="2551724"/>
+            <a:ext cx="875680" cy="461665"/>
+          </a:xfrm>
+          <a:prstGeom prst="rect">
+            <a:avLst/>
+          </a:prstGeom>
+          <a:noFill/>
+        </p:spPr>
+        <p:txBody>
+          <a:bodyPr wrap="square" rtlCol="0">
+            <a:spAutoFit/>
+          </a:bodyPr>
+          <a:lstStyle/>
+          <a:p>
+            <a:pPr algn="ctr"/>
+            <a:r>
+              <a:rPr lang="en-US" sz="1200" dirty="0">
+                <a:solidFill>
+                  <a:schemeClr val="accent6"/>
+                </a:solidFill>
+              </a:rPr>
+              <a:t>Scanning</a:t>
+            </a:r>
+          </a:p>
+          <a:p>
+            <a:pPr algn="ctr"/>
+            <a:r>
+              <a:rPr lang="en-US" sz="1200" dirty="0">
+                <a:solidFill>
+                  <a:schemeClr val="accent6"/>
+                </a:solidFill>
+              </a:rPr>
+              <a:t> event</a:t>
+            </a:r>
+          </a:p>
+        </p:txBody>
+      </p:sp>
+      <p:sp>
+        <p:nvSpPr>
+          <p:cNvPr id="57" name="TextBox 56">
+            <a:extLst>
+              <a:ext uri="{FF2B5EF4-FFF2-40B4-BE49-F238E27FC236}">
+                <a16:creationId xmlns:a16="http://schemas.microsoft.com/office/drawing/2014/main" id="{2D75520B-2337-4C24-99E8-C250ED55B616}"/>
+              </a:ext>
+            </a:extLst>
+          </p:cNvPr>
+          <p:cNvSpPr txBox="1"/>
+          <p:nvPr/>
+        </p:nvSpPr>
+        <p:spPr>
+          <a:xfrm rot="3013681">
+            <a:off x="6846595" y="2182961"/>
+            <a:ext cx="681813" cy="461665"/>
+          </a:xfrm>
+          <a:prstGeom prst="rect">
+            <a:avLst/>
+          </a:prstGeom>
+          <a:noFill/>
+        </p:spPr>
+        <p:txBody>
+          <a:bodyPr wrap="square" rtlCol="0">
+            <a:spAutoFit/>
+          </a:bodyPr>
+          <a:lstStyle/>
+          <a:p>
+            <a:pPr algn="ctr"/>
+            <a:r>
+              <a:rPr lang="en-US" sz="1200" dirty="0">
+                <a:solidFill>
+                  <a:schemeClr val="accent6"/>
+                </a:solidFill>
+              </a:rPr>
+              <a:t>Waiting</a:t>
+            </a:r>
+          </a:p>
+          <a:p>
+            <a:pPr algn="ctr"/>
+            <a:r>
+              <a:rPr lang="en-US" sz="1200" dirty="0">
+                <a:solidFill>
+                  <a:schemeClr val="accent6"/>
+                </a:solidFill>
+              </a:rPr>
+              <a:t>event</a:t>
+            </a:r>
+          </a:p>
+        </p:txBody>
+      </p:sp>
+      <p:cxnSp>
+        <p:nvCxnSpPr>
+          <p:cNvPr id="67" name="Straight Arrow Connector 66">
+            <a:extLst>
+              <a:ext uri="{FF2B5EF4-FFF2-40B4-BE49-F238E27FC236}">
+                <a16:creationId xmlns:a16="http://schemas.microsoft.com/office/drawing/2014/main" id="{EF2D3B4B-8C49-4F1E-B5A3-FDF0C9C36763}"/>
+              </a:ext>
+            </a:extLst>
+          </p:cNvPr>
+          <p:cNvCxnSpPr>
+            <a:cxnSpLocks/>
+          </p:cNvCxnSpPr>
+          <p:nvPr/>
+        </p:nvCxnSpPr>
+        <p:spPr>
+          <a:xfrm flipH="1">
+            <a:off x="5656569" y="3353009"/>
+            <a:ext cx="1261756" cy="0"/>
+          </a:xfrm>
+          <a:prstGeom prst="straightConnector1">
+            <a:avLst/>
+          </a:prstGeom>
+          <a:ln w="25400">
+            <a:solidFill>
+              <a:schemeClr val="accent6"/>
+            </a:solidFill>
+            <a:headEnd type="arrow" w="med" len="lg"/>
+            <a:tailEnd type="none" w="med" len="lg"/>
+          </a:ln>
+        </p:spPr>
+        <p:style>
+          <a:lnRef idx="1">
+            <a:schemeClr val="accent1"/>
+          </a:lnRef>
+          <a:fillRef idx="0">
+            <a:schemeClr val="accent1"/>
+          </a:fillRef>
+          <a:effectRef idx="0">
+            <a:schemeClr val="accent1"/>
+          </a:effectRef>
+          <a:fontRef idx="minor">
+            <a:schemeClr val="tx1"/>
+          </a:fontRef>
+        </p:style>
+      </p:cxnSp>
+      <p:sp>
+        <p:nvSpPr>
+          <p:cNvPr id="69" name="TextBox 68">
+            <a:extLst>
+              <a:ext uri="{FF2B5EF4-FFF2-40B4-BE49-F238E27FC236}">
+                <a16:creationId xmlns:a16="http://schemas.microsoft.com/office/drawing/2014/main" id="{F947A759-FCA1-44A5-B91F-C83CBB92CEEB}"/>
+              </a:ext>
+            </a:extLst>
+          </p:cNvPr>
+          <p:cNvSpPr txBox="1"/>
+          <p:nvPr/>
+        </p:nvSpPr>
+        <p:spPr>
+          <a:xfrm>
+            <a:off x="5674084" y="3080920"/>
+            <a:ext cx="870811" cy="276999"/>
+          </a:xfrm>
+          <a:prstGeom prst="rect">
+            <a:avLst/>
+          </a:prstGeom>
+          <a:noFill/>
+        </p:spPr>
+        <p:txBody>
+          <a:bodyPr wrap="square" rtlCol="0">
+            <a:spAutoFit/>
+          </a:bodyPr>
+          <a:lstStyle/>
+          <a:p>
+            <a:pPr algn="ctr"/>
+            <a:r>
+              <a:rPr lang="en-US" sz="1200" dirty="0">
+                <a:solidFill>
+                  <a:schemeClr val="accent6"/>
+                </a:solidFill>
+              </a:rPr>
+              <a:t>Alert event</a:t>
+            </a:r>
+          </a:p>
+        </p:txBody>
+      </p:sp>
+      <p:sp>
+        <p:nvSpPr>
+          <p:cNvPr id="81" name="TextBox 80">
+            <a:extLst>
+              <a:ext uri="{FF2B5EF4-FFF2-40B4-BE49-F238E27FC236}">
+                <a16:creationId xmlns:a16="http://schemas.microsoft.com/office/drawing/2014/main" id="{96A35E0B-C74E-41B8-A530-89EE31F5DE49}"/>
+              </a:ext>
+            </a:extLst>
+          </p:cNvPr>
+          <p:cNvSpPr txBox="1"/>
+          <p:nvPr/>
+        </p:nvSpPr>
+        <p:spPr>
+          <a:xfrm>
+            <a:off x="4439290" y="4363259"/>
+            <a:ext cx="1203890" cy="461665"/>
+          </a:xfrm>
+          <a:prstGeom prst="rect">
+            <a:avLst/>
+          </a:prstGeom>
+          <a:noFill/>
+        </p:spPr>
+        <p:txBody>
+          <a:bodyPr wrap="square" rtlCol="0">
+            <a:spAutoFit/>
+          </a:bodyPr>
+          <a:lstStyle/>
+          <a:p>
+            <a:pPr algn="ctr"/>
+            <a:r>
+              <a:rPr lang="en-US" sz="1200" dirty="0">
+                <a:solidFill>
+                  <a:srgbClr val="7030A0"/>
+                </a:solidFill>
+              </a:rPr>
+              <a:t>Aim and Gun fire event</a:t>
+            </a:r>
+          </a:p>
+        </p:txBody>
+      </p:sp>
+    </p:spTree>
+    <p:extLst>
+      <p:ext uri="{BB962C8B-B14F-4D97-AF65-F5344CB8AC3E}">
+        <p14:creationId xmlns:p14="http://schemas.microsoft.com/office/powerpoint/2010/main" val="591250893"/>
+      </p:ext>
+    </p:extLst>
+  </p:cSld>
+  <p:clrMapOvr>
+    <a:masterClrMapping/>
+  </p:clrMapOvr>
+</p:sld>
+</file>
+
 <file path=ppt/theme/theme1.xml><?xml version="1.0" encoding="utf-8"?>
 <a:theme xmlns:a="http://schemas.openxmlformats.org/drawingml/2006/main" name="Office Theme">
   <a:themeElements>

</xml_diff>